<commit_message>
Fixed arrow on powerPoint
</commit_message>
<xml_diff>
--- a/FoxFoxFoo.pptx
+++ b/FoxFoxFoo.pptx
@@ -12745,8 +12745,8 @@
           <p:nvPr/>
         </p:nvSpPr>
         <p:spPr>
-          <a:xfrm rot="19691202">
-            <a:off x="3782841" y="1800745"/>
+          <a:xfrm rot="20618061">
+            <a:off x="3585150" y="1860986"/>
             <a:ext cx="1344229" cy="461665"/>
           </a:xfrm>
           <a:prstGeom prst="rect">
@@ -12786,16 +12786,16 @@
         </p:nvSpPr>
         <p:spPr>
           <a:xfrm>
-            <a:off x="4588962" y="594731"/>
-            <a:ext cx="2426359" cy="2113112"/>
+            <a:off x="3530812" y="130294"/>
+            <a:ext cx="4358942" cy="3835861"/>
           </a:xfrm>
           <a:prstGeom prst="circularArrow">
             <a:avLst>
-              <a:gd name="adj1" fmla="val 13322"/>
-              <a:gd name="adj2" fmla="val 1161230"/>
-              <a:gd name="adj3" fmla="val 20605560"/>
-              <a:gd name="adj4" fmla="val 10800000"/>
-              <a:gd name="adj5" fmla="val 23430"/>
+              <a:gd name="adj1" fmla="val 5085"/>
+              <a:gd name="adj2" fmla="val 1064843"/>
+              <a:gd name="adj3" fmla="val 19070627"/>
+              <a:gd name="adj4" fmla="val 11316752"/>
+              <a:gd name="adj5" fmla="val 17197"/>
             </a:avLst>
           </a:prstGeom>
           <a:solidFill>
@@ -18047,20 +18047,20 @@
 </file>
 
 <file path=customXml/item2.xml><?xml version="1.0" encoding="utf-8"?>
-<p:properties xmlns:p="http://schemas.microsoft.com/office/2006/metadata/properties" xmlns:xsi="http://www.w3.org/2001/XMLSchema-instance" xmlns:pc="http://schemas.microsoft.com/office/infopath/2007/PartnerControls">
-  <documentManagement>
-    <MediaServiceKeyPoints xmlns="71af3243-3dd4-4a8d-8c0d-dd76da1f02a5" xsi:nil="true"/>
-  </documentManagement>
-</p:properties>
-</file>
-
-<file path=customXml/item3.xml><?xml version="1.0" encoding="utf-8"?>
 <?mso-contentType ?>
 <FormTemplates xmlns="http://schemas.microsoft.com/sharepoint/v3/contenttype/forms">
   <Display>DocumentLibraryForm</Display>
   <Edit>DocumentLibraryForm</Edit>
   <New>DocumentLibraryForm</New>
 </FormTemplates>
+</file>
+
+<file path=customXml/item3.xml><?xml version="1.0" encoding="utf-8"?>
+<p:properties xmlns:p="http://schemas.microsoft.com/office/2006/metadata/properties" xmlns:xsi="http://www.w3.org/2001/XMLSchema-instance" xmlns:pc="http://schemas.microsoft.com/office/infopath/2007/PartnerControls">
+  <documentManagement>
+    <MediaServiceKeyPoints xmlns="71af3243-3dd4-4a8d-8c0d-dd76da1f02a5" xsi:nil="true"/>
+  </documentManagement>
+</p:properties>
 </file>
 
 <file path=customXml/itemProps1.xml><?xml version="1.0" encoding="utf-8"?>
@@ -18083,6 +18083,14 @@
 </file>
 
 <file path=customXml/itemProps2.xml><?xml version="1.0" encoding="utf-8"?>
+<ds:datastoreItem xmlns:ds="http://schemas.openxmlformats.org/officeDocument/2006/customXml" ds:itemID="{2FD05317-60D6-4B3A-8545-888496D1A8EC}">
+  <ds:schemaRefs>
+    <ds:schemaRef ds:uri="http://schemas.microsoft.com/sharepoint/v3/contenttype/forms"/>
+  </ds:schemaRefs>
+</ds:datastoreItem>
+</file>
+
+<file path=customXml/itemProps3.xml><?xml version="1.0" encoding="utf-8"?>
 <ds:datastoreItem xmlns:ds="http://schemas.openxmlformats.org/officeDocument/2006/customXml" ds:itemID="{EF609EDA-869E-4BE5-AE5D-B898C584B6FF}">
   <ds:schemaRefs>
     <ds:schemaRef ds:uri="http://purl.org/dc/terms/"/>
@@ -18097,12 +18105,4 @@
     <ds:schemaRef ds:uri="http://www.w3.org/XML/1998/namespace"/>
   </ds:schemaRefs>
 </ds:datastoreItem>
-</file>
-
-<file path=customXml/itemProps3.xml><?xml version="1.0" encoding="utf-8"?>
-<ds:datastoreItem xmlns:ds="http://schemas.openxmlformats.org/officeDocument/2006/customXml" ds:itemID="{2FD05317-60D6-4B3A-8545-888496D1A8EC}">
-  <ds:schemaRefs>
-    <ds:schemaRef ds:uri="http://schemas.microsoft.com/sharepoint/v3/contenttype/forms"/>
-  </ds:schemaRefs>
-</ds:datastoreItem>
 </file>
</xml_diff>